<commit_message>
dp: Double sequence，Arrary:  two pointers
</commit_message>
<xml_diff>
--- a/Leetcode.pptx
+++ b/Leetcode.pptx
@@ -11,6 +11,7 @@
     <p:sldId id="259" r:id="rId5"/>
     <p:sldId id="260" r:id="rId6"/>
     <p:sldId id="261" r:id="rId7"/>
+    <p:sldId id="262" r:id="rId8"/>
   </p:sldIdLst>
   <p:sldSz cx="12192000" cy="6858000"/>
   <p:notesSz cx="6858000" cy="9144000"/>
@@ -264,7 +265,7 @@
           <a:p>
             <a:fld id="{B63B83F7-20B4-4239-B766-915E0E041876}" type="datetimeFigureOut">
               <a:rPr lang="zh-CN" altLang="en-US" smtClean="0"/>
-              <a:t>2020/7/30</a:t>
+              <a:t>2020/8/9</a:t>
             </a:fld>
             <a:endParaRPr lang="zh-CN" altLang="en-US"/>
           </a:p>
@@ -462,7 +463,7 @@
           <a:p>
             <a:fld id="{B63B83F7-20B4-4239-B766-915E0E041876}" type="datetimeFigureOut">
               <a:rPr lang="zh-CN" altLang="en-US" smtClean="0"/>
-              <a:t>2020/7/30</a:t>
+              <a:t>2020/8/9</a:t>
             </a:fld>
             <a:endParaRPr lang="zh-CN" altLang="en-US"/>
           </a:p>
@@ -670,7 +671,7 @@
           <a:p>
             <a:fld id="{B63B83F7-20B4-4239-B766-915E0E041876}" type="datetimeFigureOut">
               <a:rPr lang="zh-CN" altLang="en-US" smtClean="0"/>
-              <a:t>2020/7/30</a:t>
+              <a:t>2020/8/9</a:t>
             </a:fld>
             <a:endParaRPr lang="zh-CN" altLang="en-US"/>
           </a:p>
@@ -868,7 +869,7 @@
           <a:p>
             <a:fld id="{B63B83F7-20B4-4239-B766-915E0E041876}" type="datetimeFigureOut">
               <a:rPr lang="zh-CN" altLang="en-US" smtClean="0"/>
-              <a:t>2020/7/30</a:t>
+              <a:t>2020/8/9</a:t>
             </a:fld>
             <a:endParaRPr lang="zh-CN" altLang="en-US"/>
           </a:p>
@@ -1143,7 +1144,7 @@
           <a:p>
             <a:fld id="{B63B83F7-20B4-4239-B766-915E0E041876}" type="datetimeFigureOut">
               <a:rPr lang="zh-CN" altLang="en-US" smtClean="0"/>
-              <a:t>2020/7/30</a:t>
+              <a:t>2020/8/9</a:t>
             </a:fld>
             <a:endParaRPr lang="zh-CN" altLang="en-US"/>
           </a:p>
@@ -1408,7 +1409,7 @@
           <a:p>
             <a:fld id="{B63B83F7-20B4-4239-B766-915E0E041876}" type="datetimeFigureOut">
               <a:rPr lang="zh-CN" altLang="en-US" smtClean="0"/>
-              <a:t>2020/7/30</a:t>
+              <a:t>2020/8/9</a:t>
             </a:fld>
             <a:endParaRPr lang="zh-CN" altLang="en-US"/>
           </a:p>
@@ -1820,7 +1821,7 @@
           <a:p>
             <a:fld id="{B63B83F7-20B4-4239-B766-915E0E041876}" type="datetimeFigureOut">
               <a:rPr lang="zh-CN" altLang="en-US" smtClean="0"/>
-              <a:t>2020/7/30</a:t>
+              <a:t>2020/8/9</a:t>
             </a:fld>
             <a:endParaRPr lang="zh-CN" altLang="en-US"/>
           </a:p>
@@ -1961,7 +1962,7 @@
           <a:p>
             <a:fld id="{B63B83F7-20B4-4239-B766-915E0E041876}" type="datetimeFigureOut">
               <a:rPr lang="zh-CN" altLang="en-US" smtClean="0"/>
-              <a:t>2020/7/30</a:t>
+              <a:t>2020/8/9</a:t>
             </a:fld>
             <a:endParaRPr lang="zh-CN" altLang="en-US"/>
           </a:p>
@@ -2074,7 +2075,7 @@
           <a:p>
             <a:fld id="{B63B83F7-20B4-4239-B766-915E0E041876}" type="datetimeFigureOut">
               <a:rPr lang="zh-CN" altLang="en-US" smtClean="0"/>
-              <a:t>2020/7/30</a:t>
+              <a:t>2020/8/9</a:t>
             </a:fld>
             <a:endParaRPr lang="zh-CN" altLang="en-US"/>
           </a:p>
@@ -2385,7 +2386,7 @@
           <a:p>
             <a:fld id="{B63B83F7-20B4-4239-B766-915E0E041876}" type="datetimeFigureOut">
               <a:rPr lang="zh-CN" altLang="en-US" smtClean="0"/>
-              <a:t>2020/7/30</a:t>
+              <a:t>2020/8/9</a:t>
             </a:fld>
             <a:endParaRPr lang="zh-CN" altLang="en-US"/>
           </a:p>
@@ -2673,7 +2674,7 @@
           <a:p>
             <a:fld id="{B63B83F7-20B4-4239-B766-915E0E041876}" type="datetimeFigureOut">
               <a:rPr lang="zh-CN" altLang="en-US" smtClean="0"/>
-              <a:t>2020/7/30</a:t>
+              <a:t>2020/8/9</a:t>
             </a:fld>
             <a:endParaRPr lang="zh-CN" altLang="en-US"/>
           </a:p>
@@ -2914,7 +2915,7 @@
           <a:p>
             <a:fld id="{B63B83F7-20B4-4239-B766-915E0E041876}" type="datetimeFigureOut">
               <a:rPr lang="zh-CN" altLang="en-US" smtClean="0"/>
-              <a:t>2020/7/30</a:t>
+              <a:t>2020/8/9</a:t>
             </a:fld>
             <a:endParaRPr lang="zh-CN" altLang="en-US"/>
           </a:p>
@@ -16321,6 +16322,896 @@
 </p:sld>
 </file>
 
+<file path=ppt/slides/slide7.xml><?xml version="1.0" encoding="utf-8"?>
+<p:sld xmlns:a="http://schemas.openxmlformats.org/drawingml/2006/main" xmlns:r="http://schemas.openxmlformats.org/officeDocument/2006/relationships" xmlns:p="http://schemas.openxmlformats.org/presentationml/2006/main">
+  <p:cSld>
+    <p:spTree>
+      <p:nvGrpSpPr>
+        <p:cNvPr id="1" name=""/>
+        <p:cNvGrpSpPr/>
+        <p:nvPr/>
+      </p:nvGrpSpPr>
+      <p:grpSpPr>
+        <a:xfrm>
+          <a:off x="0" y="0"/>
+          <a:ext cx="0" cy="0"/>
+          <a:chOff x="0" y="0"/>
+          <a:chExt cx="0" cy="0"/>
+        </a:xfrm>
+      </p:grpSpPr>
+      <p:sp>
+        <p:nvSpPr>
+          <p:cNvPr id="4" name="矩形 3">
+            <a:extLst>
+              <a:ext uri="{FF2B5EF4-FFF2-40B4-BE49-F238E27FC236}">
+                <a16:creationId xmlns:a16="http://schemas.microsoft.com/office/drawing/2014/main" id="{CB479C39-7000-49C6-AEEC-3A158CF3BC00}"/>
+              </a:ext>
+            </a:extLst>
+          </p:cNvPr>
+          <p:cNvSpPr/>
+          <p:nvPr/>
+        </p:nvSpPr>
+        <p:spPr>
+          <a:xfrm>
+            <a:off x="3296651" y="433136"/>
+            <a:ext cx="577516" cy="545432"/>
+          </a:xfrm>
+          <a:prstGeom prst="rect">
+            <a:avLst/>
+          </a:prstGeom>
+        </p:spPr>
+        <p:style>
+          <a:lnRef idx="2">
+            <a:schemeClr val="accent1">
+              <a:shade val="50000"/>
+            </a:schemeClr>
+          </a:lnRef>
+          <a:fillRef idx="1">
+            <a:schemeClr val="accent1"/>
+          </a:fillRef>
+          <a:effectRef idx="0">
+            <a:schemeClr val="accent1"/>
+          </a:effectRef>
+          <a:fontRef idx="minor">
+            <a:schemeClr val="lt1"/>
+          </a:fontRef>
+        </p:style>
+        <p:txBody>
+          <a:bodyPr rtlCol="0" anchor="ctr"/>
+          <a:lstStyle/>
+          <a:p>
+            <a:pPr algn="ctr"/>
+            <a:r>
+              <a:rPr lang="en-US" altLang="zh-CN" sz="2000" dirty="0">
+                <a:latin typeface="Times New Roman" panose="02020603050405020304" pitchFamily="18" charset="0"/>
+                <a:cs typeface="Times New Roman" panose="02020603050405020304" pitchFamily="18" charset="0"/>
+              </a:rPr>
+              <a:t>2</a:t>
+            </a:r>
+            <a:endParaRPr lang="zh-CN" altLang="en-US" sz="2000" dirty="0">
+              <a:latin typeface="Times New Roman" panose="02020603050405020304" pitchFamily="18" charset="0"/>
+              <a:cs typeface="Times New Roman" panose="02020603050405020304" pitchFamily="18" charset="0"/>
+            </a:endParaRPr>
+          </a:p>
+        </p:txBody>
+      </p:sp>
+      <p:sp>
+        <p:nvSpPr>
+          <p:cNvPr id="6" name="矩形 5">
+            <a:extLst>
+              <a:ext uri="{FF2B5EF4-FFF2-40B4-BE49-F238E27FC236}">
+                <a16:creationId xmlns:a16="http://schemas.microsoft.com/office/drawing/2014/main" id="{8EBFAE34-15CF-415D-B228-78B6A9AD2349}"/>
+              </a:ext>
+            </a:extLst>
+          </p:cNvPr>
+          <p:cNvSpPr/>
+          <p:nvPr/>
+        </p:nvSpPr>
+        <p:spPr>
+          <a:xfrm>
+            <a:off x="3874167" y="433136"/>
+            <a:ext cx="577516" cy="545432"/>
+          </a:xfrm>
+          <a:prstGeom prst="rect">
+            <a:avLst/>
+          </a:prstGeom>
+        </p:spPr>
+        <p:style>
+          <a:lnRef idx="2">
+            <a:schemeClr val="accent1">
+              <a:shade val="50000"/>
+            </a:schemeClr>
+          </a:lnRef>
+          <a:fillRef idx="1">
+            <a:schemeClr val="accent1"/>
+          </a:fillRef>
+          <a:effectRef idx="0">
+            <a:schemeClr val="accent1"/>
+          </a:effectRef>
+          <a:fontRef idx="minor">
+            <a:schemeClr val="lt1"/>
+          </a:fontRef>
+        </p:style>
+        <p:txBody>
+          <a:bodyPr rtlCol="0" anchor="ctr"/>
+          <a:lstStyle/>
+          <a:p>
+            <a:pPr algn="ctr"/>
+            <a:r>
+              <a:rPr lang="en-US" altLang="zh-CN" sz="2000" dirty="0">
+                <a:latin typeface="Times New Roman" panose="02020603050405020304" pitchFamily="18" charset="0"/>
+                <a:cs typeface="Times New Roman" panose="02020603050405020304" pitchFamily="18" charset="0"/>
+              </a:rPr>
+              <a:t>2</a:t>
+            </a:r>
+            <a:endParaRPr lang="zh-CN" altLang="en-US" sz="2000" dirty="0">
+              <a:latin typeface="Times New Roman" panose="02020603050405020304" pitchFamily="18" charset="0"/>
+              <a:cs typeface="Times New Roman" panose="02020603050405020304" pitchFamily="18" charset="0"/>
+            </a:endParaRPr>
+          </a:p>
+        </p:txBody>
+      </p:sp>
+      <p:sp>
+        <p:nvSpPr>
+          <p:cNvPr id="8" name="矩形 7">
+            <a:extLst>
+              <a:ext uri="{FF2B5EF4-FFF2-40B4-BE49-F238E27FC236}">
+                <a16:creationId xmlns:a16="http://schemas.microsoft.com/office/drawing/2014/main" id="{73BDAC6C-2CD0-4367-B95E-513AE8B981D3}"/>
+              </a:ext>
+            </a:extLst>
+          </p:cNvPr>
+          <p:cNvSpPr/>
+          <p:nvPr/>
+        </p:nvSpPr>
+        <p:spPr>
+          <a:xfrm>
+            <a:off x="4451683" y="433136"/>
+            <a:ext cx="577516" cy="545432"/>
+          </a:xfrm>
+          <a:prstGeom prst="rect">
+            <a:avLst/>
+          </a:prstGeom>
+        </p:spPr>
+        <p:style>
+          <a:lnRef idx="2">
+            <a:schemeClr val="accent1">
+              <a:shade val="50000"/>
+            </a:schemeClr>
+          </a:lnRef>
+          <a:fillRef idx="1">
+            <a:schemeClr val="accent1"/>
+          </a:fillRef>
+          <a:effectRef idx="0">
+            <a:schemeClr val="accent1"/>
+          </a:effectRef>
+          <a:fontRef idx="minor">
+            <a:schemeClr val="lt1"/>
+          </a:fontRef>
+        </p:style>
+        <p:txBody>
+          <a:bodyPr rtlCol="0" anchor="ctr"/>
+          <a:lstStyle/>
+          <a:p>
+            <a:pPr algn="ctr"/>
+            <a:r>
+              <a:rPr lang="en-US" altLang="zh-CN" sz="2000" dirty="0">
+                <a:latin typeface="Times New Roman" panose="02020603050405020304" pitchFamily="18" charset="0"/>
+                <a:cs typeface="Times New Roman" panose="02020603050405020304" pitchFamily="18" charset="0"/>
+              </a:rPr>
+              <a:t>2</a:t>
+            </a:r>
+            <a:endParaRPr lang="zh-CN" altLang="en-US" sz="2000" dirty="0">
+              <a:latin typeface="Times New Roman" panose="02020603050405020304" pitchFamily="18" charset="0"/>
+              <a:cs typeface="Times New Roman" panose="02020603050405020304" pitchFamily="18" charset="0"/>
+            </a:endParaRPr>
+          </a:p>
+        </p:txBody>
+      </p:sp>
+      <p:sp>
+        <p:nvSpPr>
+          <p:cNvPr id="10" name="矩形 9">
+            <a:extLst>
+              <a:ext uri="{FF2B5EF4-FFF2-40B4-BE49-F238E27FC236}">
+                <a16:creationId xmlns:a16="http://schemas.microsoft.com/office/drawing/2014/main" id="{86DE731E-D918-4D96-957D-2F7596B29824}"/>
+              </a:ext>
+            </a:extLst>
+          </p:cNvPr>
+          <p:cNvSpPr/>
+          <p:nvPr/>
+        </p:nvSpPr>
+        <p:spPr>
+          <a:xfrm>
+            <a:off x="5029199" y="433136"/>
+            <a:ext cx="577516" cy="545432"/>
+          </a:xfrm>
+          <a:prstGeom prst="rect">
+            <a:avLst/>
+          </a:prstGeom>
+        </p:spPr>
+        <p:style>
+          <a:lnRef idx="2">
+            <a:schemeClr val="accent1">
+              <a:shade val="50000"/>
+            </a:schemeClr>
+          </a:lnRef>
+          <a:fillRef idx="1">
+            <a:schemeClr val="accent1"/>
+          </a:fillRef>
+          <a:effectRef idx="0">
+            <a:schemeClr val="accent1"/>
+          </a:effectRef>
+          <a:fontRef idx="minor">
+            <a:schemeClr val="lt1"/>
+          </a:fontRef>
+        </p:style>
+        <p:txBody>
+          <a:bodyPr rtlCol="0" anchor="ctr"/>
+          <a:lstStyle/>
+          <a:p>
+            <a:pPr algn="ctr"/>
+            <a:r>
+              <a:rPr lang="en-US" altLang="zh-CN" sz="2000" dirty="0">
+                <a:latin typeface="Times New Roman" panose="02020603050405020304" pitchFamily="18" charset="0"/>
+                <a:cs typeface="Times New Roman" panose="02020603050405020304" pitchFamily="18" charset="0"/>
+              </a:rPr>
+              <a:t>2</a:t>
+            </a:r>
+            <a:endParaRPr lang="zh-CN" altLang="en-US" sz="2000" dirty="0">
+              <a:latin typeface="Times New Roman" panose="02020603050405020304" pitchFamily="18" charset="0"/>
+              <a:cs typeface="Times New Roman" panose="02020603050405020304" pitchFamily="18" charset="0"/>
+            </a:endParaRPr>
+          </a:p>
+        </p:txBody>
+      </p:sp>
+      <p:sp>
+        <p:nvSpPr>
+          <p:cNvPr id="12" name="矩形 11">
+            <a:extLst>
+              <a:ext uri="{FF2B5EF4-FFF2-40B4-BE49-F238E27FC236}">
+                <a16:creationId xmlns:a16="http://schemas.microsoft.com/office/drawing/2014/main" id="{3E5E7BDF-CCCA-42C0-A390-04683A35F9FA}"/>
+              </a:ext>
+            </a:extLst>
+          </p:cNvPr>
+          <p:cNvSpPr/>
+          <p:nvPr/>
+        </p:nvSpPr>
+        <p:spPr>
+          <a:xfrm>
+            <a:off x="5606715" y="433136"/>
+            <a:ext cx="577516" cy="545432"/>
+          </a:xfrm>
+          <a:prstGeom prst="rect">
+            <a:avLst/>
+          </a:prstGeom>
+        </p:spPr>
+        <p:style>
+          <a:lnRef idx="2">
+            <a:schemeClr val="accent1">
+              <a:shade val="50000"/>
+            </a:schemeClr>
+          </a:lnRef>
+          <a:fillRef idx="1">
+            <a:schemeClr val="accent1"/>
+          </a:fillRef>
+          <a:effectRef idx="0">
+            <a:schemeClr val="accent1"/>
+          </a:effectRef>
+          <a:fontRef idx="minor">
+            <a:schemeClr val="lt1"/>
+          </a:fontRef>
+        </p:style>
+        <p:txBody>
+          <a:bodyPr rtlCol="0" anchor="ctr"/>
+          <a:lstStyle/>
+          <a:p>
+            <a:pPr algn="ctr"/>
+            <a:r>
+              <a:rPr lang="en-US" altLang="zh-CN" sz="2000" dirty="0">
+                <a:latin typeface="Times New Roman" panose="02020603050405020304" pitchFamily="18" charset="0"/>
+                <a:cs typeface="Times New Roman" panose="02020603050405020304" pitchFamily="18" charset="0"/>
+              </a:rPr>
+              <a:t>2</a:t>
+            </a:r>
+            <a:endParaRPr lang="zh-CN" altLang="en-US" sz="2000" dirty="0">
+              <a:latin typeface="Times New Roman" panose="02020603050405020304" pitchFamily="18" charset="0"/>
+              <a:cs typeface="Times New Roman" panose="02020603050405020304" pitchFamily="18" charset="0"/>
+            </a:endParaRPr>
+          </a:p>
+        </p:txBody>
+      </p:sp>
+      <p:sp>
+        <p:nvSpPr>
+          <p:cNvPr id="14" name="矩形 13">
+            <a:extLst>
+              <a:ext uri="{FF2B5EF4-FFF2-40B4-BE49-F238E27FC236}">
+                <a16:creationId xmlns:a16="http://schemas.microsoft.com/office/drawing/2014/main" id="{081790D6-9917-4617-BE24-CC353BF71CBD}"/>
+              </a:ext>
+            </a:extLst>
+          </p:cNvPr>
+          <p:cNvSpPr/>
+          <p:nvPr/>
+        </p:nvSpPr>
+        <p:spPr>
+          <a:xfrm>
+            <a:off x="6184231" y="433136"/>
+            <a:ext cx="577516" cy="545432"/>
+          </a:xfrm>
+          <a:prstGeom prst="rect">
+            <a:avLst/>
+          </a:prstGeom>
+        </p:spPr>
+        <p:style>
+          <a:lnRef idx="2">
+            <a:schemeClr val="accent1">
+              <a:shade val="50000"/>
+            </a:schemeClr>
+          </a:lnRef>
+          <a:fillRef idx="1">
+            <a:schemeClr val="accent1"/>
+          </a:fillRef>
+          <a:effectRef idx="0">
+            <a:schemeClr val="accent1"/>
+          </a:effectRef>
+          <a:fontRef idx="minor">
+            <a:schemeClr val="lt1"/>
+          </a:fontRef>
+        </p:style>
+        <p:txBody>
+          <a:bodyPr rtlCol="0" anchor="ctr"/>
+          <a:lstStyle/>
+          <a:p>
+            <a:pPr algn="ctr"/>
+            <a:r>
+              <a:rPr lang="en-US" altLang="zh-CN" sz="2000" dirty="0">
+                <a:latin typeface="Times New Roman" panose="02020603050405020304" pitchFamily="18" charset="0"/>
+                <a:cs typeface="Times New Roman" panose="02020603050405020304" pitchFamily="18" charset="0"/>
+              </a:rPr>
+              <a:t>0</a:t>
+            </a:r>
+            <a:endParaRPr lang="zh-CN" altLang="en-US" sz="2000" dirty="0">
+              <a:latin typeface="Times New Roman" panose="02020603050405020304" pitchFamily="18" charset="0"/>
+              <a:cs typeface="Times New Roman" panose="02020603050405020304" pitchFamily="18" charset="0"/>
+            </a:endParaRPr>
+          </a:p>
+        </p:txBody>
+      </p:sp>
+      <p:sp>
+        <p:nvSpPr>
+          <p:cNvPr id="16" name="矩形 15">
+            <a:extLst>
+              <a:ext uri="{FF2B5EF4-FFF2-40B4-BE49-F238E27FC236}">
+                <a16:creationId xmlns:a16="http://schemas.microsoft.com/office/drawing/2014/main" id="{FAF0C846-A14D-4A90-8496-768A051C757D}"/>
+              </a:ext>
+            </a:extLst>
+          </p:cNvPr>
+          <p:cNvSpPr/>
+          <p:nvPr/>
+        </p:nvSpPr>
+        <p:spPr>
+          <a:xfrm>
+            <a:off x="6761747" y="433136"/>
+            <a:ext cx="577516" cy="545432"/>
+          </a:xfrm>
+          <a:prstGeom prst="rect">
+            <a:avLst/>
+          </a:prstGeom>
+        </p:spPr>
+        <p:style>
+          <a:lnRef idx="2">
+            <a:schemeClr val="accent1">
+              <a:shade val="50000"/>
+            </a:schemeClr>
+          </a:lnRef>
+          <a:fillRef idx="1">
+            <a:schemeClr val="accent1"/>
+          </a:fillRef>
+          <a:effectRef idx="0">
+            <a:schemeClr val="accent1"/>
+          </a:effectRef>
+          <a:fontRef idx="minor">
+            <a:schemeClr val="lt1"/>
+          </a:fontRef>
+        </p:style>
+        <p:txBody>
+          <a:bodyPr rtlCol="0" anchor="ctr"/>
+          <a:lstStyle/>
+          <a:p>
+            <a:pPr algn="ctr"/>
+            <a:r>
+              <a:rPr lang="en-US" altLang="zh-CN" sz="2000" dirty="0">
+                <a:latin typeface="Times New Roman" panose="02020603050405020304" pitchFamily="18" charset="0"/>
+                <a:cs typeface="Times New Roman" panose="02020603050405020304" pitchFamily="18" charset="0"/>
+              </a:rPr>
+              <a:t>1</a:t>
+            </a:r>
+            <a:endParaRPr lang="zh-CN" altLang="en-US" sz="2000" dirty="0">
+              <a:latin typeface="Times New Roman" panose="02020603050405020304" pitchFamily="18" charset="0"/>
+              <a:cs typeface="Times New Roman" panose="02020603050405020304" pitchFamily="18" charset="0"/>
+            </a:endParaRPr>
+          </a:p>
+        </p:txBody>
+      </p:sp>
+      <p:sp>
+        <p:nvSpPr>
+          <p:cNvPr id="18" name="矩形 17">
+            <a:extLst>
+              <a:ext uri="{FF2B5EF4-FFF2-40B4-BE49-F238E27FC236}">
+                <a16:creationId xmlns:a16="http://schemas.microsoft.com/office/drawing/2014/main" id="{21E73647-7DF4-46C7-BA57-D32426939519}"/>
+              </a:ext>
+            </a:extLst>
+          </p:cNvPr>
+          <p:cNvSpPr/>
+          <p:nvPr/>
+        </p:nvSpPr>
+        <p:spPr>
+          <a:xfrm>
+            <a:off x="7339263" y="433136"/>
+            <a:ext cx="577516" cy="545432"/>
+          </a:xfrm>
+          <a:prstGeom prst="rect">
+            <a:avLst/>
+          </a:prstGeom>
+        </p:spPr>
+        <p:style>
+          <a:lnRef idx="2">
+            <a:schemeClr val="accent1">
+              <a:shade val="50000"/>
+            </a:schemeClr>
+          </a:lnRef>
+          <a:fillRef idx="1">
+            <a:schemeClr val="accent1"/>
+          </a:fillRef>
+          <a:effectRef idx="0">
+            <a:schemeClr val="accent1"/>
+          </a:effectRef>
+          <a:fontRef idx="minor">
+            <a:schemeClr val="lt1"/>
+          </a:fontRef>
+        </p:style>
+        <p:txBody>
+          <a:bodyPr rtlCol="0" anchor="ctr"/>
+          <a:lstStyle/>
+          <a:p>
+            <a:pPr algn="ctr"/>
+            <a:r>
+              <a:rPr lang="en-US" altLang="zh-CN" sz="2000" dirty="0">
+                <a:latin typeface="Times New Roman" panose="02020603050405020304" pitchFamily="18" charset="0"/>
+                <a:cs typeface="Times New Roman" panose="02020603050405020304" pitchFamily="18" charset="0"/>
+              </a:rPr>
+              <a:t>2</a:t>
+            </a:r>
+            <a:endParaRPr lang="zh-CN" altLang="en-US" sz="2000" dirty="0">
+              <a:latin typeface="Times New Roman" panose="02020603050405020304" pitchFamily="18" charset="0"/>
+              <a:cs typeface="Times New Roman" panose="02020603050405020304" pitchFamily="18" charset="0"/>
+            </a:endParaRPr>
+          </a:p>
+        </p:txBody>
+      </p:sp>
+      <p:sp>
+        <p:nvSpPr>
+          <p:cNvPr id="20" name="矩形 19">
+            <a:extLst>
+              <a:ext uri="{FF2B5EF4-FFF2-40B4-BE49-F238E27FC236}">
+                <a16:creationId xmlns:a16="http://schemas.microsoft.com/office/drawing/2014/main" id="{AB3423CF-8A4C-4CF6-A670-699210E1C4B0}"/>
+              </a:ext>
+            </a:extLst>
+          </p:cNvPr>
+          <p:cNvSpPr/>
+          <p:nvPr/>
+        </p:nvSpPr>
+        <p:spPr>
+          <a:xfrm>
+            <a:off x="7916779" y="433136"/>
+            <a:ext cx="577516" cy="545432"/>
+          </a:xfrm>
+          <a:prstGeom prst="rect">
+            <a:avLst/>
+          </a:prstGeom>
+        </p:spPr>
+        <p:style>
+          <a:lnRef idx="2">
+            <a:schemeClr val="accent1">
+              <a:shade val="50000"/>
+            </a:schemeClr>
+          </a:lnRef>
+          <a:fillRef idx="1">
+            <a:schemeClr val="accent1"/>
+          </a:fillRef>
+          <a:effectRef idx="0">
+            <a:schemeClr val="accent1"/>
+          </a:effectRef>
+          <a:fontRef idx="minor">
+            <a:schemeClr val="lt1"/>
+          </a:fontRef>
+        </p:style>
+        <p:txBody>
+          <a:bodyPr rtlCol="0" anchor="ctr"/>
+          <a:lstStyle/>
+          <a:p>
+            <a:pPr algn="ctr"/>
+            <a:r>
+              <a:rPr lang="en-US" altLang="zh-CN" sz="2000" dirty="0">
+                <a:latin typeface="Times New Roman" panose="02020603050405020304" pitchFamily="18" charset="0"/>
+                <a:cs typeface="Times New Roman" panose="02020603050405020304" pitchFamily="18" charset="0"/>
+              </a:rPr>
+              <a:t>2</a:t>
+            </a:r>
+            <a:endParaRPr lang="zh-CN" altLang="en-US" sz="2000" dirty="0">
+              <a:latin typeface="Times New Roman" panose="02020603050405020304" pitchFamily="18" charset="0"/>
+              <a:cs typeface="Times New Roman" panose="02020603050405020304" pitchFamily="18" charset="0"/>
+            </a:endParaRPr>
+          </a:p>
+        </p:txBody>
+      </p:sp>
+      <p:sp>
+        <p:nvSpPr>
+          <p:cNvPr id="21" name="箭头: 下 20">
+            <a:extLst>
+              <a:ext uri="{FF2B5EF4-FFF2-40B4-BE49-F238E27FC236}">
+                <a16:creationId xmlns:a16="http://schemas.microsoft.com/office/drawing/2014/main" id="{5509446E-08CA-4A3A-B959-2960EFF9E921}"/>
+              </a:ext>
+            </a:extLst>
+          </p:cNvPr>
+          <p:cNvSpPr/>
+          <p:nvPr/>
+        </p:nvSpPr>
+        <p:spPr>
+          <a:xfrm rot="10800000">
+            <a:off x="6304547" y="1006641"/>
+            <a:ext cx="336884" cy="545432"/>
+          </a:xfrm>
+          <a:prstGeom prst="downArrow">
+            <a:avLst/>
+          </a:prstGeom>
+        </p:spPr>
+        <p:style>
+          <a:lnRef idx="2">
+            <a:schemeClr val="accent6">
+              <a:shade val="50000"/>
+            </a:schemeClr>
+          </a:lnRef>
+          <a:fillRef idx="1">
+            <a:schemeClr val="accent6"/>
+          </a:fillRef>
+          <a:effectRef idx="0">
+            <a:schemeClr val="accent6"/>
+          </a:effectRef>
+          <a:fontRef idx="minor">
+            <a:schemeClr val="lt1"/>
+          </a:fontRef>
+        </p:style>
+        <p:txBody>
+          <a:bodyPr rtlCol="0" anchor="ctr"/>
+          <a:lstStyle/>
+          <a:p>
+            <a:pPr algn="ctr"/>
+            <a:endParaRPr lang="zh-CN" altLang="en-US"/>
+          </a:p>
+        </p:txBody>
+      </p:sp>
+      <p:sp>
+        <p:nvSpPr>
+          <p:cNvPr id="23" name="文本框 22">
+            <a:extLst>
+              <a:ext uri="{FF2B5EF4-FFF2-40B4-BE49-F238E27FC236}">
+                <a16:creationId xmlns:a16="http://schemas.microsoft.com/office/drawing/2014/main" id="{693A169F-A6D2-48D8-9C30-D66BB29B6282}"/>
+              </a:ext>
+            </a:extLst>
+          </p:cNvPr>
+          <p:cNvSpPr txBox="1"/>
+          <p:nvPr/>
+        </p:nvSpPr>
+        <p:spPr>
+          <a:xfrm>
+            <a:off x="778040" y="2125579"/>
+            <a:ext cx="8783055" cy="4197559"/>
+          </a:xfrm>
+          <a:prstGeom prst="rect">
+            <a:avLst/>
+          </a:prstGeom>
+          <a:noFill/>
+        </p:spPr>
+        <p:txBody>
+          <a:bodyPr wrap="square" rtlCol="0">
+            <a:spAutoFit/>
+          </a:bodyPr>
+          <a:lstStyle/>
+          <a:p>
+            <a:pPr>
+              <a:lnSpc>
+                <a:spcPct val="150000"/>
+              </a:lnSpc>
+            </a:pPr>
+            <a:r>
+              <a:rPr lang="zh-CN" altLang="en-US" dirty="0">
+                <a:latin typeface="Times New Roman" panose="02020603050405020304" pitchFamily="18" charset="0"/>
+                <a:ea typeface="宋体" panose="02010600030101010101" pitchFamily="2" charset="-122"/>
+                <a:cs typeface="Times New Roman" panose="02020603050405020304" pitchFamily="18" charset="0"/>
+              </a:rPr>
+              <a:t>当前的数组中，存在相同的元素，此时，</a:t>
+            </a:r>
+            <a:endParaRPr lang="en-US" altLang="zh-CN" dirty="0">
+              <a:latin typeface="Times New Roman" panose="02020603050405020304" pitchFamily="18" charset="0"/>
+              <a:ea typeface="宋体" panose="02010600030101010101" pitchFamily="2" charset="-122"/>
+              <a:cs typeface="Times New Roman" panose="02020603050405020304" pitchFamily="18" charset="0"/>
+            </a:endParaRPr>
+          </a:p>
+          <a:p>
+            <a:pPr>
+              <a:lnSpc>
+                <a:spcPct val="150000"/>
+              </a:lnSpc>
+            </a:pPr>
+            <a:r>
+              <a:rPr lang="en-US" altLang="zh-CN" dirty="0">
+                <a:latin typeface="Times New Roman" panose="02020603050405020304" pitchFamily="18" charset="0"/>
+                <a:ea typeface="宋体" panose="02010600030101010101" pitchFamily="2" charset="-122"/>
+                <a:cs typeface="Times New Roman" panose="02020603050405020304" pitchFamily="18" charset="0"/>
+              </a:rPr>
+              <a:t>left_index = 0, right_index = 8, middle_idx=4</a:t>
+            </a:r>
+          </a:p>
+          <a:p>
+            <a:pPr>
+              <a:lnSpc>
+                <a:spcPct val="150000"/>
+              </a:lnSpc>
+            </a:pPr>
+            <a:endParaRPr lang="en-US" altLang="zh-CN" dirty="0">
+              <a:latin typeface="Times New Roman" panose="02020603050405020304" pitchFamily="18" charset="0"/>
+              <a:ea typeface="宋体" panose="02010600030101010101" pitchFamily="2" charset="-122"/>
+              <a:cs typeface="Times New Roman" panose="02020603050405020304" pitchFamily="18" charset="0"/>
+            </a:endParaRPr>
+          </a:p>
+          <a:p>
+            <a:pPr>
+              <a:lnSpc>
+                <a:spcPct val="150000"/>
+              </a:lnSpc>
+            </a:pPr>
+            <a:r>
+              <a:rPr lang="zh-CN" altLang="en-US" dirty="0">
+                <a:latin typeface="Times New Roman" panose="02020603050405020304" pitchFamily="18" charset="0"/>
+                <a:ea typeface="宋体" panose="02010600030101010101" pitchFamily="2" charset="-122"/>
+                <a:cs typeface="Times New Roman" panose="02020603050405020304" pitchFamily="18" charset="0"/>
+              </a:rPr>
+              <a:t>每次比较都会出现三种情况：</a:t>
+            </a:r>
+            <a:endParaRPr lang="en-US" altLang="zh-CN" dirty="0">
+              <a:latin typeface="Times New Roman" panose="02020603050405020304" pitchFamily="18" charset="0"/>
+              <a:ea typeface="宋体" panose="02010600030101010101" pitchFamily="2" charset="-122"/>
+              <a:cs typeface="Times New Roman" panose="02020603050405020304" pitchFamily="18" charset="0"/>
+            </a:endParaRPr>
+          </a:p>
+          <a:p>
+            <a:pPr marL="800100" lvl="1" indent="-342900">
+              <a:lnSpc>
+                <a:spcPct val="150000"/>
+              </a:lnSpc>
+              <a:buAutoNum type="arabicParenBoth"/>
+            </a:pPr>
+            <a:r>
+              <a:rPr lang="en-US" altLang="zh-CN" dirty="0">
+                <a:latin typeface="Times New Roman" panose="02020603050405020304" pitchFamily="18" charset="0"/>
+                <a:ea typeface="宋体" panose="02010600030101010101" pitchFamily="2" charset="-122"/>
+                <a:cs typeface="Times New Roman" panose="02020603050405020304" pitchFamily="18" charset="0"/>
+              </a:rPr>
+              <a:t>num[m_idx] &gt; nums[r_idx], </a:t>
+            </a:r>
+            <a:r>
+              <a:rPr lang="zh-CN" altLang="en-US" dirty="0">
+                <a:latin typeface="Times New Roman" panose="02020603050405020304" pitchFamily="18" charset="0"/>
+                <a:ea typeface="宋体" panose="02010600030101010101" pitchFamily="2" charset="-122"/>
+                <a:cs typeface="Times New Roman" panose="02020603050405020304" pitchFamily="18" charset="0"/>
+              </a:rPr>
+              <a:t>比如 </a:t>
+            </a:r>
+            <a:r>
+              <a:rPr lang="en-US" altLang="zh-CN" dirty="0">
+                <a:latin typeface="Times New Roman" panose="02020603050405020304" pitchFamily="18" charset="0"/>
+                <a:ea typeface="宋体" panose="02010600030101010101" pitchFamily="2" charset="-122"/>
+                <a:cs typeface="Times New Roman" panose="02020603050405020304" pitchFamily="18" charset="0"/>
+              </a:rPr>
+              <a:t>[5,6,7,8,0,1,2], 8&gt;2, </a:t>
+            </a:r>
+            <a:r>
+              <a:rPr lang="zh-CN" altLang="en-US" dirty="0">
+                <a:latin typeface="Times New Roman" panose="02020603050405020304" pitchFamily="18" charset="0"/>
+                <a:ea typeface="宋体" panose="02010600030101010101" pitchFamily="2" charset="-122"/>
+                <a:cs typeface="Times New Roman" panose="02020603050405020304" pitchFamily="18" charset="0"/>
+              </a:rPr>
+              <a:t>此时，最小值一定在左区间，因此，</a:t>
+            </a:r>
+            <a:r>
+              <a:rPr lang="en-US" altLang="zh-CN" dirty="0" err="1">
+                <a:latin typeface="Times New Roman" panose="02020603050405020304" pitchFamily="18" charset="0"/>
+                <a:ea typeface="宋体" panose="02010600030101010101" pitchFamily="2" charset="-122"/>
+                <a:cs typeface="Times New Roman" panose="02020603050405020304" pitchFamily="18" charset="0"/>
+              </a:rPr>
+              <a:t>l_idx</a:t>
+            </a:r>
+            <a:r>
+              <a:rPr lang="en-US" altLang="zh-CN" dirty="0">
+                <a:latin typeface="Times New Roman" panose="02020603050405020304" pitchFamily="18" charset="0"/>
+                <a:ea typeface="宋体" panose="02010600030101010101" pitchFamily="2" charset="-122"/>
+                <a:cs typeface="Times New Roman" panose="02020603050405020304" pitchFamily="18" charset="0"/>
+              </a:rPr>
+              <a:t> = m_idx += 1</a:t>
+            </a:r>
+          </a:p>
+          <a:p>
+            <a:pPr marL="800100" lvl="1" indent="-342900">
+              <a:lnSpc>
+                <a:spcPct val="150000"/>
+              </a:lnSpc>
+              <a:buFontTx/>
+              <a:buAutoNum type="arabicParenBoth"/>
+            </a:pPr>
+            <a:r>
+              <a:rPr lang="en-US" altLang="zh-CN" dirty="0">
+                <a:latin typeface="Times New Roman" panose="02020603050405020304" pitchFamily="18" charset="0"/>
+                <a:ea typeface="宋体" panose="02010600030101010101" pitchFamily="2" charset="-122"/>
+                <a:cs typeface="Times New Roman" panose="02020603050405020304" pitchFamily="18" charset="0"/>
+              </a:rPr>
+              <a:t>num[m_idx] = nums[r_idx], </a:t>
+            </a:r>
+            <a:r>
+              <a:rPr lang="zh-CN" altLang="en-US" dirty="0">
+                <a:latin typeface="Times New Roman" panose="02020603050405020304" pitchFamily="18" charset="0"/>
+                <a:ea typeface="宋体" panose="02010600030101010101" pitchFamily="2" charset="-122"/>
+                <a:cs typeface="Times New Roman" panose="02020603050405020304" pitchFamily="18" charset="0"/>
+              </a:rPr>
+              <a:t>比如</a:t>
+            </a:r>
+            <a:r>
+              <a:rPr lang="en-US" altLang="zh-CN" dirty="0">
+                <a:latin typeface="Times New Roman" panose="02020603050405020304" pitchFamily="18" charset="0"/>
+                <a:ea typeface="宋体" panose="02010600030101010101" pitchFamily="2" charset="-122"/>
+                <a:cs typeface="Times New Roman" panose="02020603050405020304" pitchFamily="18" charset="0"/>
+              </a:rPr>
+              <a:t>[2,2,2,0,1,2], 2 = 2, </a:t>
+            </a:r>
+            <a:r>
+              <a:rPr lang="zh-CN" altLang="en-US" dirty="0">
+                <a:latin typeface="Times New Roman" panose="02020603050405020304" pitchFamily="18" charset="0"/>
+                <a:ea typeface="宋体" panose="02010600030101010101" pitchFamily="2" charset="-122"/>
+                <a:cs typeface="Times New Roman" panose="02020603050405020304" pitchFamily="18" charset="0"/>
+              </a:rPr>
+              <a:t>此时，可以去掉最后一个元素</a:t>
+            </a:r>
+            <a:r>
+              <a:rPr lang="en-US" altLang="zh-CN" dirty="0">
+                <a:latin typeface="Times New Roman" panose="02020603050405020304" pitchFamily="18" charset="0"/>
+                <a:ea typeface="宋体" panose="02010600030101010101" pitchFamily="2" charset="-122"/>
+                <a:cs typeface="Times New Roman" panose="02020603050405020304" pitchFamily="18" charset="0"/>
+              </a:rPr>
+              <a:t>, </a:t>
+            </a:r>
+            <a:r>
+              <a:rPr lang="zh-CN" altLang="en-US" dirty="0">
+                <a:latin typeface="Times New Roman" panose="02020603050405020304" pitchFamily="18" charset="0"/>
+                <a:ea typeface="宋体" panose="02010600030101010101" pitchFamily="2" charset="-122"/>
+                <a:cs typeface="Times New Roman" panose="02020603050405020304" pitchFamily="18" charset="0"/>
+              </a:rPr>
+              <a:t>即，</a:t>
+            </a:r>
+            <a:r>
+              <a:rPr lang="en-US" altLang="zh-CN" dirty="0">
+                <a:latin typeface="Times New Roman" panose="02020603050405020304" pitchFamily="18" charset="0"/>
+                <a:ea typeface="宋体" panose="02010600030101010101" pitchFamily="2" charset="-122"/>
+                <a:cs typeface="Times New Roman" panose="02020603050405020304" pitchFamily="18" charset="0"/>
+              </a:rPr>
+              <a:t>r_idx -= 1.</a:t>
+            </a:r>
+          </a:p>
+          <a:p>
+            <a:pPr marL="800100" lvl="1" indent="-342900">
+              <a:lnSpc>
+                <a:spcPct val="150000"/>
+              </a:lnSpc>
+              <a:buFontTx/>
+              <a:buAutoNum type="arabicParenBoth"/>
+            </a:pPr>
+            <a:r>
+              <a:rPr lang="en-US" altLang="zh-CN" dirty="0">
+                <a:latin typeface="Times New Roman" panose="02020603050405020304" pitchFamily="18" charset="0"/>
+                <a:ea typeface="宋体" panose="02010600030101010101" pitchFamily="2" charset="-122"/>
+                <a:cs typeface="Times New Roman" panose="02020603050405020304" pitchFamily="18" charset="0"/>
+              </a:rPr>
+              <a:t>num[m_idx] &lt; nums[r_idx], </a:t>
+            </a:r>
+            <a:r>
+              <a:rPr lang="zh-CN" altLang="en-US" dirty="0">
+                <a:latin typeface="Times New Roman" panose="02020603050405020304" pitchFamily="18" charset="0"/>
+                <a:ea typeface="宋体" panose="02010600030101010101" pitchFamily="2" charset="-122"/>
+                <a:cs typeface="Times New Roman" panose="02020603050405020304" pitchFamily="18" charset="0"/>
+              </a:rPr>
+              <a:t>比如</a:t>
+            </a:r>
+            <a:r>
+              <a:rPr lang="en-US" altLang="zh-CN" dirty="0">
+                <a:latin typeface="Times New Roman" panose="02020603050405020304" pitchFamily="18" charset="0"/>
+                <a:ea typeface="宋体" panose="02010600030101010101" pitchFamily="2" charset="-122"/>
+                <a:cs typeface="Times New Roman" panose="02020603050405020304" pitchFamily="18" charset="0"/>
+              </a:rPr>
+              <a:t>[2,2,0,1,2], 0 &lt; 2, </a:t>
+            </a:r>
+            <a:r>
+              <a:rPr lang="zh-CN" altLang="en-US" dirty="0">
+                <a:latin typeface="Times New Roman" panose="02020603050405020304" pitchFamily="18" charset="0"/>
+                <a:ea typeface="宋体" panose="02010600030101010101" pitchFamily="2" charset="-122"/>
+                <a:cs typeface="Times New Roman" panose="02020603050405020304" pitchFamily="18" charset="0"/>
+              </a:rPr>
+              <a:t>此时，</a:t>
+            </a:r>
+            <a:r>
+              <a:rPr lang="en-US" altLang="zh-CN" dirty="0">
+                <a:latin typeface="Times New Roman" panose="02020603050405020304" pitchFamily="18" charset="0"/>
+                <a:ea typeface="宋体" panose="02010600030101010101" pitchFamily="2" charset="-122"/>
+                <a:cs typeface="Times New Roman" panose="02020603050405020304" pitchFamily="18" charset="0"/>
+              </a:rPr>
+              <a:t>r_idx = m_idx.</a:t>
+            </a:r>
+          </a:p>
+          <a:p>
+            <a:pPr lvl="1">
+              <a:lnSpc>
+                <a:spcPct val="150000"/>
+              </a:lnSpc>
+            </a:pPr>
+            <a:r>
+              <a:rPr lang="en-US" altLang="zh-CN" dirty="0">
+                <a:latin typeface="Times New Roman" panose="02020603050405020304" pitchFamily="18" charset="0"/>
+                <a:ea typeface="宋体" panose="02010600030101010101" pitchFamily="2" charset="-122"/>
+                <a:cs typeface="Times New Roman" panose="02020603050405020304" pitchFamily="18" charset="0"/>
+              </a:rPr>
+              <a:t>      </a:t>
+            </a:r>
+            <a:r>
+              <a:rPr lang="zh-CN" altLang="en-US" dirty="0">
+                <a:latin typeface="Times New Roman" panose="02020603050405020304" pitchFamily="18" charset="0"/>
+                <a:ea typeface="宋体" panose="02010600030101010101" pitchFamily="2" charset="-122"/>
+                <a:cs typeface="Times New Roman" panose="02020603050405020304" pitchFamily="18" charset="0"/>
+              </a:rPr>
+              <a:t>此时，</a:t>
+            </a:r>
+            <a:r>
+              <a:rPr lang="en-US" altLang="zh-CN" dirty="0">
+                <a:latin typeface="Times New Roman" panose="02020603050405020304" pitchFamily="18" charset="0"/>
+                <a:ea typeface="宋体" panose="02010600030101010101" pitchFamily="2" charset="-122"/>
+                <a:cs typeface="Times New Roman" panose="02020603050405020304" pitchFamily="18" charset="0"/>
+              </a:rPr>
+              <a:t>nums = [2,2,0], 2 &gt;0, l_idx = m_idx + 1 = 2, l_idx = r_idx, </a:t>
+            </a:r>
+            <a:r>
+              <a:rPr lang="zh-CN" altLang="en-US" dirty="0">
+                <a:latin typeface="Times New Roman" panose="02020603050405020304" pitchFamily="18" charset="0"/>
+                <a:ea typeface="宋体" panose="02010600030101010101" pitchFamily="2" charset="-122"/>
+                <a:cs typeface="Times New Roman" panose="02020603050405020304" pitchFamily="18" charset="0"/>
+              </a:rPr>
+              <a:t>返回退出。</a:t>
+            </a:r>
+            <a:endParaRPr lang="en-US" altLang="zh-CN" dirty="0">
+              <a:latin typeface="Times New Roman" panose="02020603050405020304" pitchFamily="18" charset="0"/>
+              <a:ea typeface="宋体" panose="02010600030101010101" pitchFamily="2" charset="-122"/>
+              <a:cs typeface="Times New Roman" panose="02020603050405020304" pitchFamily="18" charset="0"/>
+            </a:endParaRPr>
+          </a:p>
+        </p:txBody>
+      </p:sp>
+    </p:spTree>
+    <p:extLst>
+      <p:ext uri="{BB962C8B-B14F-4D97-AF65-F5344CB8AC3E}">
+        <p14:creationId xmlns:p14="http://schemas.microsoft.com/office/powerpoint/2010/main" val="3435801649"/>
+      </p:ext>
+    </p:extLst>
+  </p:cSld>
+  <p:clrMapOvr>
+    <a:masterClrMapping/>
+  </p:clrMapOvr>
+</p:sld>
+</file>
+
 <file path=ppt/theme/theme1.xml><?xml version="1.0" encoding="utf-8"?>
 <a:theme xmlns:a="http://schemas.openxmlformats.org/drawingml/2006/main" name="Office 主题​​">
   <a:themeElements>

</xml_diff>